<commit_message>
update written portion to reflect sample level analysis
</commit_message>
<xml_diff>
--- a/3 Minute Presentation.pptx
+++ b/3 Minute Presentation.pptx
@@ -117,7 +117,7 @@
 <file path=ppt/revisionInfo.xml><?xml version="1.0" encoding="utf-8"?>
 <p1510:revInfo xmlns:a="http://schemas.openxmlformats.org/drawingml/2006/main" xmlns:r="http://schemas.openxmlformats.org/officeDocument/2006/relationships" xmlns:p1510="http://schemas.microsoft.com/office/powerpoint/2015/10/main">
   <p1510:revLst>
-    <p1510:client id="{ABA3A2AB-DDEC-414F-B735-33C2F4627402}" v="2" dt="2020-03-24T02:15:16.664"/>
+    <p1510:client id="{83311C7E-2833-415D-A3A7-B0ACE7C88196}" v="2" dt="2020-04-11T22:31:05.117"/>
   </p1510:revLst>
 </p1510:revInfo>
 </file>
@@ -803,6 +803,709 @@
             <ac:picMk id="6" creationId="{4EF4C110-C34C-4A81-BC07-090334EAD496}"/>
           </ac:picMkLst>
         </pc:picChg>
+      </pc:sldChg>
+    </pc:docChg>
+  </pc:docChgLst>
+  <pc:docChgLst>
+    <pc:chgData name="Meaghan Winder" userId="e7dbd1f288b20f78" providerId="LiveId" clId="{83311C7E-2833-415D-A3A7-B0ACE7C88196}"/>
+    <pc:docChg chg="undo custSel modSld">
+      <pc:chgData name="Meaghan Winder" userId="e7dbd1f288b20f78" providerId="LiveId" clId="{83311C7E-2833-415D-A3A7-B0ACE7C88196}" dt="2020-04-18T16:49:58.687" v="262" actId="478"/>
+      <pc:docMkLst>
+        <pc:docMk/>
+      </pc:docMkLst>
+      <pc:sldChg chg="modSp">
+        <pc:chgData name="Meaghan Winder" userId="e7dbd1f288b20f78" providerId="LiveId" clId="{83311C7E-2833-415D-A3A7-B0ACE7C88196}" dt="2020-04-11T22:26:46.499" v="23" actId="14100"/>
+        <pc:sldMkLst>
+          <pc:docMk/>
+          <pc:sldMk cId="701564972" sldId="257"/>
+        </pc:sldMkLst>
+        <pc:spChg chg="mod">
+          <ac:chgData name="Meaghan Winder" userId="e7dbd1f288b20f78" providerId="LiveId" clId="{83311C7E-2833-415D-A3A7-B0ACE7C88196}" dt="2020-04-11T22:26:07.430" v="20" actId="20577"/>
+          <ac:spMkLst>
+            <pc:docMk/>
+            <pc:sldMk cId="701564972" sldId="257"/>
+            <ac:spMk id="109" creationId="{6541FBD9-D2C7-4451-BEEB-86ABA6D78A1D}"/>
+          </ac:spMkLst>
+        </pc:spChg>
+        <pc:spChg chg="mod">
+          <ac:chgData name="Meaghan Winder" userId="e7dbd1f288b20f78" providerId="LiveId" clId="{83311C7E-2833-415D-A3A7-B0ACE7C88196}" dt="2020-04-11T22:26:06.124" v="18" actId="20577"/>
+          <ac:spMkLst>
+            <pc:docMk/>
+            <pc:sldMk cId="701564972" sldId="257"/>
+            <ac:spMk id="111" creationId="{26A309AA-F5E5-48A4-896A-72458985CCFE}"/>
+          </ac:spMkLst>
+        </pc:spChg>
+        <pc:cxnChg chg="mod">
+          <ac:chgData name="Meaghan Winder" userId="e7dbd1f288b20f78" providerId="LiveId" clId="{83311C7E-2833-415D-A3A7-B0ACE7C88196}" dt="2020-04-11T22:26:46.499" v="23" actId="14100"/>
+          <ac:cxnSpMkLst>
+            <pc:docMk/>
+            <pc:sldMk cId="701564972" sldId="257"/>
+            <ac:cxnSpMk id="125" creationId="{80CB0DB3-C30F-4056-A056-FA7374D9BDD5}"/>
+          </ac:cxnSpMkLst>
+        </pc:cxnChg>
+        <pc:cxnChg chg="mod">
+          <ac:chgData name="Meaghan Winder" userId="e7dbd1f288b20f78" providerId="LiveId" clId="{83311C7E-2833-415D-A3A7-B0ACE7C88196}" dt="2020-04-11T22:26:06.124" v="18" actId="20577"/>
+          <ac:cxnSpMkLst>
+            <pc:docMk/>
+            <pc:sldMk cId="701564972" sldId="257"/>
+            <ac:cxnSpMk id="128" creationId="{06BA903A-4C49-4628-A7D8-217BA5C54172}"/>
+          </ac:cxnSpMkLst>
+        </pc:cxnChg>
+      </pc:sldChg>
+      <pc:sldChg chg="addSp delSp modSp">
+        <pc:chgData name="Meaghan Winder" userId="e7dbd1f288b20f78" providerId="LiveId" clId="{83311C7E-2833-415D-A3A7-B0ACE7C88196}" dt="2020-04-18T16:49:58.687" v="262" actId="478"/>
+        <pc:sldMkLst>
+          <pc:docMk/>
+          <pc:sldMk cId="2686133521" sldId="259"/>
+        </pc:sldMkLst>
+        <pc:spChg chg="del mod">
+          <ac:chgData name="Meaghan Winder" userId="e7dbd1f288b20f78" providerId="LiveId" clId="{83311C7E-2833-415D-A3A7-B0ACE7C88196}" dt="2020-04-11T22:29:39.595" v="166" actId="478"/>
+          <ac:spMkLst>
+            <pc:docMk/>
+            <pc:sldMk cId="2686133521" sldId="259"/>
+            <ac:spMk id="6" creationId="{4F72032D-0F02-4938-BAB1-C82DBF53198D}"/>
+          </ac:spMkLst>
+        </pc:spChg>
+        <pc:spChg chg="del">
+          <ac:chgData name="Meaghan Winder" userId="e7dbd1f288b20f78" providerId="LiveId" clId="{83311C7E-2833-415D-A3A7-B0ACE7C88196}" dt="2020-04-11T22:30:54.912" v="182" actId="478"/>
+          <ac:spMkLst>
+            <pc:docMk/>
+            <pc:sldMk cId="2686133521" sldId="259"/>
+            <ac:spMk id="7" creationId="{A94C2E2F-CD36-4302-87FB-04F2D5D191A8}"/>
+          </ac:spMkLst>
+        </pc:spChg>
+        <pc:spChg chg="del mod">
+          <ac:chgData name="Meaghan Winder" userId="e7dbd1f288b20f78" providerId="LiveId" clId="{83311C7E-2833-415D-A3A7-B0ACE7C88196}" dt="2020-04-11T22:29:21.696" v="160" actId="478"/>
+          <ac:spMkLst>
+            <pc:docMk/>
+            <pc:sldMk cId="2686133521" sldId="259"/>
+            <ac:spMk id="8" creationId="{9A2508D2-99AB-45C9-991C-7B6326382FD8}"/>
+          </ac:spMkLst>
+        </pc:spChg>
+        <pc:spChg chg="del">
+          <ac:chgData name="Meaghan Winder" userId="e7dbd1f288b20f78" providerId="LiveId" clId="{83311C7E-2833-415D-A3A7-B0ACE7C88196}" dt="2020-04-11T22:30:54.912" v="182" actId="478"/>
+          <ac:spMkLst>
+            <pc:docMk/>
+            <pc:sldMk cId="2686133521" sldId="259"/>
+            <ac:spMk id="10" creationId="{2FEE30CC-B088-486B-A2DF-64261DF910C9}"/>
+          </ac:spMkLst>
+        </pc:spChg>
+        <pc:spChg chg="del">
+          <ac:chgData name="Meaghan Winder" userId="e7dbd1f288b20f78" providerId="LiveId" clId="{83311C7E-2833-415D-A3A7-B0ACE7C88196}" dt="2020-04-11T22:30:54.912" v="182" actId="478"/>
+          <ac:spMkLst>
+            <pc:docMk/>
+            <pc:sldMk cId="2686133521" sldId="259"/>
+            <ac:spMk id="11" creationId="{D9E98563-D76B-4483-85F9-BA7E350CEED0}"/>
+          </ac:spMkLst>
+        </pc:spChg>
+        <pc:spChg chg="del">
+          <ac:chgData name="Meaghan Winder" userId="e7dbd1f288b20f78" providerId="LiveId" clId="{83311C7E-2833-415D-A3A7-B0ACE7C88196}" dt="2020-04-11T22:30:54.912" v="182" actId="478"/>
+          <ac:spMkLst>
+            <pc:docMk/>
+            <pc:sldMk cId="2686133521" sldId="259"/>
+            <ac:spMk id="12" creationId="{4C8F7575-6EC9-4A4C-BDD9-0306F1AA662C}"/>
+          </ac:spMkLst>
+        </pc:spChg>
+        <pc:spChg chg="del mod">
+          <ac:chgData name="Meaghan Winder" userId="e7dbd1f288b20f78" providerId="LiveId" clId="{83311C7E-2833-415D-A3A7-B0ACE7C88196}" dt="2020-04-11T22:30:04.255" v="174" actId="478"/>
+          <ac:spMkLst>
+            <pc:docMk/>
+            <pc:sldMk cId="2686133521" sldId="259"/>
+            <ac:spMk id="15" creationId="{2D8FB126-796E-4E04-9C6B-E125E0A6967D}"/>
+          </ac:spMkLst>
+        </pc:spChg>
+        <pc:spChg chg="del">
+          <ac:chgData name="Meaghan Winder" userId="e7dbd1f288b20f78" providerId="LiveId" clId="{83311C7E-2833-415D-A3A7-B0ACE7C88196}" dt="2020-04-11T22:30:17.634" v="177" actId="478"/>
+          <ac:spMkLst>
+            <pc:docMk/>
+            <pc:sldMk cId="2686133521" sldId="259"/>
+            <ac:spMk id="16" creationId="{3A476F38-7B84-479B-83DF-9B39F8C2FA95}"/>
+          </ac:spMkLst>
+        </pc:spChg>
+        <pc:spChg chg="del">
+          <ac:chgData name="Meaghan Winder" userId="e7dbd1f288b20f78" providerId="LiveId" clId="{83311C7E-2833-415D-A3A7-B0ACE7C88196}" dt="2020-04-11T22:30:34.984" v="180" actId="478"/>
+          <ac:spMkLst>
+            <pc:docMk/>
+            <pc:sldMk cId="2686133521" sldId="259"/>
+            <ac:spMk id="17" creationId="{F6FA13F2-830A-4C4E-95BB-ACF9F774F520}"/>
+          </ac:spMkLst>
+        </pc:spChg>
+        <pc:spChg chg="add del mod">
+          <ac:chgData name="Meaghan Winder" userId="e7dbd1f288b20f78" providerId="LiveId" clId="{83311C7E-2833-415D-A3A7-B0ACE7C88196}" dt="2020-04-11T22:30:56.834" v="183" actId="478"/>
+          <ac:spMkLst>
+            <pc:docMk/>
+            <pc:sldMk cId="2686133521" sldId="259"/>
+            <ac:spMk id="18" creationId="{43E835FB-AA8E-45A7-B871-A1765BDACB21}"/>
+          </ac:spMkLst>
+        </pc:spChg>
+        <pc:spChg chg="add del mod">
+          <ac:chgData name="Meaghan Winder" userId="e7dbd1f288b20f78" providerId="LiveId" clId="{83311C7E-2833-415D-A3A7-B0ACE7C88196}" dt="2020-04-11T22:30:54.912" v="182" actId="478"/>
+          <ac:spMkLst>
+            <pc:docMk/>
+            <pc:sldMk cId="2686133521" sldId="259"/>
+            <ac:spMk id="19" creationId="{2060FF42-49D0-4CA2-9800-6DD7C03B6B54}"/>
+          </ac:spMkLst>
+        </pc:spChg>
+        <pc:spChg chg="add del">
+          <ac:chgData name="Meaghan Winder" userId="e7dbd1f288b20f78" providerId="LiveId" clId="{83311C7E-2833-415D-A3A7-B0ACE7C88196}" dt="2020-04-11T22:30:54.912" v="182" actId="478"/>
+          <ac:spMkLst>
+            <pc:docMk/>
+            <pc:sldMk cId="2686133521" sldId="259"/>
+            <ac:spMk id="20" creationId="{F4EBDD9B-FF6B-4E77-BC60-3F14729419CF}"/>
+          </ac:spMkLst>
+        </pc:spChg>
+        <pc:spChg chg="add del mod">
+          <ac:chgData name="Meaghan Winder" userId="e7dbd1f288b20f78" providerId="LiveId" clId="{83311C7E-2833-415D-A3A7-B0ACE7C88196}" dt="2020-04-11T22:30:54.912" v="182" actId="478"/>
+          <ac:spMkLst>
+            <pc:docMk/>
+            <pc:sldMk cId="2686133521" sldId="259"/>
+            <ac:spMk id="23" creationId="{411AF317-DB0C-493B-87CA-6D311E30BF15}"/>
+          </ac:spMkLst>
+        </pc:spChg>
+        <pc:spChg chg="add del mod">
+          <ac:chgData name="Meaghan Winder" userId="e7dbd1f288b20f78" providerId="LiveId" clId="{83311C7E-2833-415D-A3A7-B0ACE7C88196}" dt="2020-04-11T22:30:54.912" v="182" actId="478"/>
+          <ac:spMkLst>
+            <pc:docMk/>
+            <pc:sldMk cId="2686133521" sldId="259"/>
+            <ac:spMk id="24" creationId="{E5E38E18-76F5-4D22-9D81-62B0089425BD}"/>
+          </ac:spMkLst>
+        </pc:spChg>
+        <pc:spChg chg="add del">
+          <ac:chgData name="Meaghan Winder" userId="e7dbd1f288b20f78" providerId="LiveId" clId="{83311C7E-2833-415D-A3A7-B0ACE7C88196}" dt="2020-04-11T22:30:54.912" v="182" actId="478"/>
+          <ac:spMkLst>
+            <pc:docMk/>
+            <pc:sldMk cId="2686133521" sldId="259"/>
+            <ac:spMk id="25" creationId="{972ED1CA-22F5-4C95-A573-1DCB8A1610BE}"/>
+          </ac:spMkLst>
+        </pc:spChg>
+        <pc:spChg chg="add del">
+          <ac:chgData name="Meaghan Winder" userId="e7dbd1f288b20f78" providerId="LiveId" clId="{83311C7E-2833-415D-A3A7-B0ACE7C88196}" dt="2020-04-11T22:30:54.912" v="182" actId="478"/>
+          <ac:spMkLst>
+            <pc:docMk/>
+            <pc:sldMk cId="2686133521" sldId="259"/>
+            <ac:spMk id="26" creationId="{6ED4DE99-521C-41E7-843A-D6AC69C3A3CC}"/>
+          </ac:spMkLst>
+        </pc:spChg>
+        <pc:spChg chg="add del">
+          <ac:chgData name="Meaghan Winder" userId="e7dbd1f288b20f78" providerId="LiveId" clId="{83311C7E-2833-415D-A3A7-B0ACE7C88196}" dt="2020-04-11T22:30:54.912" v="182" actId="478"/>
+          <ac:spMkLst>
+            <pc:docMk/>
+            <pc:sldMk cId="2686133521" sldId="259"/>
+            <ac:spMk id="29" creationId="{7A13DA40-6175-4E3C-86E7-BC16E982CB3C}"/>
+          </ac:spMkLst>
+        </pc:spChg>
+        <pc:spChg chg="add del">
+          <ac:chgData name="Meaghan Winder" userId="e7dbd1f288b20f78" providerId="LiveId" clId="{83311C7E-2833-415D-A3A7-B0ACE7C88196}" dt="2020-04-11T22:30:54.912" v="182" actId="478"/>
+          <ac:spMkLst>
+            <pc:docMk/>
+            <pc:sldMk cId="2686133521" sldId="259"/>
+            <ac:spMk id="30" creationId="{9F95D451-737E-4B63-BDB1-CAE094B5C574}"/>
+          </ac:spMkLst>
+        </pc:spChg>
+        <pc:spChg chg="add del mod">
+          <ac:chgData name="Meaghan Winder" userId="e7dbd1f288b20f78" providerId="LiveId" clId="{83311C7E-2833-415D-A3A7-B0ACE7C88196}" dt="2020-04-11T22:30:54.912" v="182" actId="478"/>
+          <ac:spMkLst>
+            <pc:docMk/>
+            <pc:sldMk cId="2686133521" sldId="259"/>
+            <ac:spMk id="31" creationId="{1AAF3173-6E0B-4E4C-99C6-03C1644E2538}"/>
+          </ac:spMkLst>
+        </pc:spChg>
+        <pc:spChg chg="add del mod">
+          <ac:chgData name="Meaghan Winder" userId="e7dbd1f288b20f78" providerId="LiveId" clId="{83311C7E-2833-415D-A3A7-B0ACE7C88196}" dt="2020-04-11T22:30:54.912" v="182" actId="478"/>
+          <ac:spMkLst>
+            <pc:docMk/>
+            <pc:sldMk cId="2686133521" sldId="259"/>
+            <ac:spMk id="32" creationId="{546958A3-D704-44DF-80D6-71F3501672A4}"/>
+          </ac:spMkLst>
+        </pc:spChg>
+        <pc:spChg chg="add del mod">
+          <ac:chgData name="Meaghan Winder" userId="e7dbd1f288b20f78" providerId="LiveId" clId="{83311C7E-2833-415D-A3A7-B0ACE7C88196}" dt="2020-04-11T22:30:54.912" v="182" actId="478"/>
+          <ac:spMkLst>
+            <pc:docMk/>
+            <pc:sldMk cId="2686133521" sldId="259"/>
+            <ac:spMk id="33" creationId="{B5ABF41D-7A2D-496F-A2C6-F6524AC79527}"/>
+          </ac:spMkLst>
+        </pc:spChg>
+        <pc:spChg chg="add del mod">
+          <ac:chgData name="Meaghan Winder" userId="e7dbd1f288b20f78" providerId="LiveId" clId="{83311C7E-2833-415D-A3A7-B0ACE7C88196}" dt="2020-04-11T22:30:54.912" v="182" actId="478"/>
+          <ac:spMkLst>
+            <pc:docMk/>
+            <pc:sldMk cId="2686133521" sldId="259"/>
+            <ac:spMk id="34" creationId="{BBAEFE85-B668-447D-91B1-EB22EE62F05B}"/>
+          </ac:spMkLst>
+        </pc:spChg>
+        <pc:spChg chg="add del mod">
+          <ac:chgData name="Meaghan Winder" userId="e7dbd1f288b20f78" providerId="LiveId" clId="{83311C7E-2833-415D-A3A7-B0ACE7C88196}" dt="2020-04-11T22:30:54.912" v="182" actId="478"/>
+          <ac:spMkLst>
+            <pc:docMk/>
+            <pc:sldMk cId="2686133521" sldId="259"/>
+            <ac:spMk id="35" creationId="{49B18AC9-E53B-439D-80C5-98AD8AE92E4A}"/>
+          </ac:spMkLst>
+        </pc:spChg>
+        <pc:spChg chg="add del">
+          <ac:chgData name="Meaghan Winder" userId="e7dbd1f288b20f78" providerId="LiveId" clId="{83311C7E-2833-415D-A3A7-B0ACE7C88196}" dt="2020-04-11T22:30:54.912" v="182" actId="478"/>
+          <ac:spMkLst>
+            <pc:docMk/>
+            <pc:sldMk cId="2686133521" sldId="259"/>
+            <ac:spMk id="36" creationId="{E759639D-54EB-441C-8379-78C35C7AE168}"/>
+          </ac:spMkLst>
+        </pc:spChg>
+        <pc:spChg chg="add del mod">
+          <ac:chgData name="Meaghan Winder" userId="e7dbd1f288b20f78" providerId="LiveId" clId="{83311C7E-2833-415D-A3A7-B0ACE7C88196}" dt="2020-04-11T22:30:54.912" v="182" actId="478"/>
+          <ac:spMkLst>
+            <pc:docMk/>
+            <pc:sldMk cId="2686133521" sldId="259"/>
+            <ac:spMk id="37" creationId="{E8BD2630-1617-49FE-9371-CA2E25F126B6}"/>
+          </ac:spMkLst>
+        </pc:spChg>
+        <pc:spChg chg="add del mod">
+          <ac:chgData name="Meaghan Winder" userId="e7dbd1f288b20f78" providerId="LiveId" clId="{83311C7E-2833-415D-A3A7-B0ACE7C88196}" dt="2020-04-11T22:30:54.912" v="182" actId="478"/>
+          <ac:spMkLst>
+            <pc:docMk/>
+            <pc:sldMk cId="2686133521" sldId="259"/>
+            <ac:spMk id="46" creationId="{9320CB68-701E-42C3-A4AC-FC37E7F2BD03}"/>
+          </ac:spMkLst>
+        </pc:spChg>
+        <pc:spChg chg="add del mod">
+          <ac:chgData name="Meaghan Winder" userId="e7dbd1f288b20f78" providerId="LiveId" clId="{83311C7E-2833-415D-A3A7-B0ACE7C88196}" dt="2020-04-11T22:30:54.912" v="182" actId="478"/>
+          <ac:spMkLst>
+            <pc:docMk/>
+            <pc:sldMk cId="2686133521" sldId="259"/>
+            <ac:spMk id="47" creationId="{FCED30DB-01AE-4830-9CD0-8F536E536DD6}"/>
+          </ac:spMkLst>
+        </pc:spChg>
+        <pc:spChg chg="add del mod">
+          <ac:chgData name="Meaghan Winder" userId="e7dbd1f288b20f78" providerId="LiveId" clId="{83311C7E-2833-415D-A3A7-B0ACE7C88196}" dt="2020-04-11T22:30:54.912" v="182" actId="478"/>
+          <ac:spMkLst>
+            <pc:docMk/>
+            <pc:sldMk cId="2686133521" sldId="259"/>
+            <ac:spMk id="48" creationId="{F50227ED-B4A9-4AF5-873E-1B5C1E00F3AE}"/>
+          </ac:spMkLst>
+        </pc:spChg>
+        <pc:spChg chg="add del mod">
+          <ac:chgData name="Meaghan Winder" userId="e7dbd1f288b20f78" providerId="LiveId" clId="{83311C7E-2833-415D-A3A7-B0ACE7C88196}" dt="2020-04-11T22:30:54.912" v="182" actId="478"/>
+          <ac:spMkLst>
+            <pc:docMk/>
+            <pc:sldMk cId="2686133521" sldId="259"/>
+            <ac:spMk id="49" creationId="{500DEBD7-88B1-4F00-8D83-3F173D7C0289}"/>
+          </ac:spMkLst>
+        </pc:spChg>
+        <pc:spChg chg="add del">
+          <ac:chgData name="Meaghan Winder" userId="e7dbd1f288b20f78" providerId="LiveId" clId="{83311C7E-2833-415D-A3A7-B0ACE7C88196}" dt="2020-04-11T22:30:54.912" v="182" actId="478"/>
+          <ac:spMkLst>
+            <pc:docMk/>
+            <pc:sldMk cId="2686133521" sldId="259"/>
+            <ac:spMk id="50" creationId="{E5444DB2-2A4B-4DF9-8E3F-AC9C76B8EAA9}"/>
+          </ac:spMkLst>
+        </pc:spChg>
+        <pc:spChg chg="add del mod">
+          <ac:chgData name="Meaghan Winder" userId="e7dbd1f288b20f78" providerId="LiveId" clId="{83311C7E-2833-415D-A3A7-B0ACE7C88196}" dt="2020-04-11T22:30:54.912" v="182" actId="478"/>
+          <ac:spMkLst>
+            <pc:docMk/>
+            <pc:sldMk cId="2686133521" sldId="259"/>
+            <ac:spMk id="51" creationId="{4501F9E3-2F5F-4950-B61F-A98AD7FD1B9D}"/>
+          </ac:spMkLst>
+        </pc:spChg>
+        <pc:spChg chg="add">
+          <ac:chgData name="Meaghan Winder" userId="e7dbd1f288b20f78" providerId="LiveId" clId="{83311C7E-2833-415D-A3A7-B0ACE7C88196}" dt="2020-04-11T22:31:05.117" v="184"/>
+          <ac:spMkLst>
+            <pc:docMk/>
+            <pc:sldMk cId="2686133521" sldId="259"/>
+            <ac:spMk id="79" creationId="{ADA8B93A-DD2D-4B4A-A408-5789D44A879A}"/>
+          </ac:spMkLst>
+        </pc:spChg>
+        <pc:spChg chg="add">
+          <ac:chgData name="Meaghan Winder" userId="e7dbd1f288b20f78" providerId="LiveId" clId="{83311C7E-2833-415D-A3A7-B0ACE7C88196}" dt="2020-04-11T22:31:05.117" v="184"/>
+          <ac:spMkLst>
+            <pc:docMk/>
+            <pc:sldMk cId="2686133521" sldId="259"/>
+            <ac:spMk id="80" creationId="{04E29E8A-08DD-4D82-B2F6-C9733330964A}"/>
+          </ac:spMkLst>
+        </pc:spChg>
+        <pc:spChg chg="add">
+          <ac:chgData name="Meaghan Winder" userId="e7dbd1f288b20f78" providerId="LiveId" clId="{83311C7E-2833-415D-A3A7-B0ACE7C88196}" dt="2020-04-11T22:31:05.117" v="184"/>
+          <ac:spMkLst>
+            <pc:docMk/>
+            <pc:sldMk cId="2686133521" sldId="259"/>
+            <ac:spMk id="81" creationId="{199982C2-DDA1-43AB-B0B6-929919D831F4}"/>
+          </ac:spMkLst>
+        </pc:spChg>
+        <pc:spChg chg="add">
+          <ac:chgData name="Meaghan Winder" userId="e7dbd1f288b20f78" providerId="LiveId" clId="{83311C7E-2833-415D-A3A7-B0ACE7C88196}" dt="2020-04-11T22:31:05.117" v="184"/>
+          <ac:spMkLst>
+            <pc:docMk/>
+            <pc:sldMk cId="2686133521" sldId="259"/>
+            <ac:spMk id="82" creationId="{C3C89471-D961-4EFF-BCCF-04B48FE33390}"/>
+          </ac:spMkLst>
+        </pc:spChg>
+        <pc:spChg chg="add del mod">
+          <ac:chgData name="Meaghan Winder" userId="e7dbd1f288b20f78" providerId="LiveId" clId="{83311C7E-2833-415D-A3A7-B0ACE7C88196}" dt="2020-04-18T16:49:58.687" v="262" actId="478"/>
+          <ac:spMkLst>
+            <pc:docMk/>
+            <pc:sldMk cId="2686133521" sldId="259"/>
+            <ac:spMk id="83" creationId="{581DB5D6-8081-4B0C-B1F2-CB4256119419}"/>
+          </ac:spMkLst>
+        </pc:spChg>
+        <pc:spChg chg="add">
+          <ac:chgData name="Meaghan Winder" userId="e7dbd1f288b20f78" providerId="LiveId" clId="{83311C7E-2833-415D-A3A7-B0ACE7C88196}" dt="2020-04-11T22:31:05.117" v="184"/>
+          <ac:spMkLst>
+            <pc:docMk/>
+            <pc:sldMk cId="2686133521" sldId="259"/>
+            <ac:spMk id="84" creationId="{533B03F3-F6CB-4250-A1A5-39AD70495F11}"/>
+          </ac:spMkLst>
+        </pc:spChg>
+        <pc:spChg chg="add">
+          <ac:chgData name="Meaghan Winder" userId="e7dbd1f288b20f78" providerId="LiveId" clId="{83311C7E-2833-415D-A3A7-B0ACE7C88196}" dt="2020-04-11T22:31:05.117" v="184"/>
+          <ac:spMkLst>
+            <pc:docMk/>
+            <pc:sldMk cId="2686133521" sldId="259"/>
+            <ac:spMk id="85" creationId="{49A91055-103F-4E26-8DB5-07A2C2115C86}"/>
+          </ac:spMkLst>
+        </pc:spChg>
+        <pc:spChg chg="add">
+          <ac:chgData name="Meaghan Winder" userId="e7dbd1f288b20f78" providerId="LiveId" clId="{83311C7E-2833-415D-A3A7-B0ACE7C88196}" dt="2020-04-11T22:31:05.117" v="184"/>
+          <ac:spMkLst>
+            <pc:docMk/>
+            <pc:sldMk cId="2686133521" sldId="259"/>
+            <ac:spMk id="86" creationId="{BD768D00-B6AF-40BB-AB70-867A5D1072C3}"/>
+          </ac:spMkLst>
+        </pc:spChg>
+        <pc:spChg chg="add del">
+          <ac:chgData name="Meaghan Winder" userId="e7dbd1f288b20f78" providerId="LiveId" clId="{83311C7E-2833-415D-A3A7-B0ACE7C88196}" dt="2020-04-18T16:49:58.687" v="262" actId="478"/>
+          <ac:spMkLst>
+            <pc:docMk/>
+            <pc:sldMk cId="2686133521" sldId="259"/>
+            <ac:spMk id="87" creationId="{776C83F7-AA62-4923-8B32-E5C7AA2D444E}"/>
+          </ac:spMkLst>
+        </pc:spChg>
+        <pc:spChg chg="add del mod">
+          <ac:chgData name="Meaghan Winder" userId="e7dbd1f288b20f78" providerId="LiveId" clId="{83311C7E-2833-415D-A3A7-B0ACE7C88196}" dt="2020-04-18T16:49:58.687" v="262" actId="478"/>
+          <ac:spMkLst>
+            <pc:docMk/>
+            <pc:sldMk cId="2686133521" sldId="259"/>
+            <ac:spMk id="88" creationId="{1A71C181-9455-4137-A41A-FB9E44700416}"/>
+          </ac:spMkLst>
+        </pc:spChg>
+        <pc:spChg chg="add">
+          <ac:chgData name="Meaghan Winder" userId="e7dbd1f288b20f78" providerId="LiveId" clId="{83311C7E-2833-415D-A3A7-B0ACE7C88196}" dt="2020-04-11T22:31:05.117" v="184"/>
+          <ac:spMkLst>
+            <pc:docMk/>
+            <pc:sldMk cId="2686133521" sldId="259"/>
+            <ac:spMk id="89" creationId="{2661F273-36DF-4138-BAF0-4654A485A96C}"/>
+          </ac:spMkLst>
+        </pc:spChg>
+        <pc:spChg chg="add">
+          <ac:chgData name="Meaghan Winder" userId="e7dbd1f288b20f78" providerId="LiveId" clId="{83311C7E-2833-415D-A3A7-B0ACE7C88196}" dt="2020-04-11T22:31:05.117" v="184"/>
+          <ac:spMkLst>
+            <pc:docMk/>
+            <pc:sldMk cId="2686133521" sldId="259"/>
+            <ac:spMk id="90" creationId="{C4148CDA-266C-418F-9BF9-1DFFDA6DDA0B}"/>
+          </ac:spMkLst>
+        </pc:spChg>
+        <pc:spChg chg="add">
+          <ac:chgData name="Meaghan Winder" userId="e7dbd1f288b20f78" providerId="LiveId" clId="{83311C7E-2833-415D-A3A7-B0ACE7C88196}" dt="2020-04-11T22:31:05.117" v="184"/>
+          <ac:spMkLst>
+            <pc:docMk/>
+            <pc:sldMk cId="2686133521" sldId="259"/>
+            <ac:spMk id="91" creationId="{E46A55F6-5DC9-4035-8A2E-5F588D4D8716}"/>
+          </ac:spMkLst>
+        </pc:spChg>
+        <pc:spChg chg="add del mod">
+          <ac:chgData name="Meaghan Winder" userId="e7dbd1f288b20f78" providerId="LiveId" clId="{83311C7E-2833-415D-A3A7-B0ACE7C88196}" dt="2020-04-18T16:49:55.690" v="261" actId="478"/>
+          <ac:spMkLst>
+            <pc:docMk/>
+            <pc:sldMk cId="2686133521" sldId="259"/>
+            <ac:spMk id="92" creationId="{5DC48E2B-B355-4171-8833-FF2F1A25FA27}"/>
+          </ac:spMkLst>
+        </pc:spChg>
+        <pc:spChg chg="add del">
+          <ac:chgData name="Meaghan Winder" userId="e7dbd1f288b20f78" providerId="LiveId" clId="{83311C7E-2833-415D-A3A7-B0ACE7C88196}" dt="2020-04-18T16:49:58.687" v="262" actId="478"/>
+          <ac:spMkLst>
+            <pc:docMk/>
+            <pc:sldMk cId="2686133521" sldId="259"/>
+            <ac:spMk id="93" creationId="{EF2BDB83-C78C-49BE-B731-41300A0A40E7}"/>
+          </ac:spMkLst>
+        </pc:spChg>
+        <pc:spChg chg="add del mod">
+          <ac:chgData name="Meaghan Winder" userId="e7dbd1f288b20f78" providerId="LiveId" clId="{83311C7E-2833-415D-A3A7-B0ACE7C88196}" dt="2020-04-18T16:49:58.687" v="262" actId="478"/>
+          <ac:spMkLst>
+            <pc:docMk/>
+            <pc:sldMk cId="2686133521" sldId="259"/>
+            <ac:spMk id="94" creationId="{ABFDA1E1-3525-403F-8D12-A144ABDD4688}"/>
+          </ac:spMkLst>
+        </pc:spChg>
+        <pc:spChg chg="add del mod">
+          <ac:chgData name="Meaghan Winder" userId="e7dbd1f288b20f78" providerId="LiveId" clId="{83311C7E-2833-415D-A3A7-B0ACE7C88196}" dt="2020-04-18T16:49:58.687" v="262" actId="478"/>
+          <ac:spMkLst>
+            <pc:docMk/>
+            <pc:sldMk cId="2686133521" sldId="259"/>
+            <ac:spMk id="103" creationId="{55E87436-A0D6-4637-8698-9A295444AC78}"/>
+          </ac:spMkLst>
+        </pc:spChg>
+        <pc:spChg chg="add del">
+          <ac:chgData name="Meaghan Winder" userId="e7dbd1f288b20f78" providerId="LiveId" clId="{83311C7E-2833-415D-A3A7-B0ACE7C88196}" dt="2020-04-18T16:49:58.687" v="262" actId="478"/>
+          <ac:spMkLst>
+            <pc:docMk/>
+            <pc:sldMk cId="2686133521" sldId="259"/>
+            <ac:spMk id="104" creationId="{7230D38E-4F9A-44B0-830A-8660AF08AE73}"/>
+          </ac:spMkLst>
+        </pc:spChg>
+        <pc:spChg chg="add del mod">
+          <ac:chgData name="Meaghan Winder" userId="e7dbd1f288b20f78" providerId="LiveId" clId="{83311C7E-2833-415D-A3A7-B0ACE7C88196}" dt="2020-04-18T16:49:58.687" v="262" actId="478"/>
+          <ac:spMkLst>
+            <pc:docMk/>
+            <pc:sldMk cId="2686133521" sldId="259"/>
+            <ac:spMk id="105" creationId="{EF6C53D8-A6F4-4805-93FA-EA7799E420F1}"/>
+          </ac:spMkLst>
+        </pc:spChg>
+        <pc:spChg chg="add del mod">
+          <ac:chgData name="Meaghan Winder" userId="e7dbd1f288b20f78" providerId="LiveId" clId="{83311C7E-2833-415D-A3A7-B0ACE7C88196}" dt="2020-04-18T16:49:58.687" v="262" actId="478"/>
+          <ac:spMkLst>
+            <pc:docMk/>
+            <pc:sldMk cId="2686133521" sldId="259"/>
+            <ac:spMk id="106" creationId="{D55BB07C-A2B5-4F1F-BE3D-76A7C663578B}"/>
+          </ac:spMkLst>
+        </pc:spChg>
+        <pc:spChg chg="add del">
+          <ac:chgData name="Meaghan Winder" userId="e7dbd1f288b20f78" providerId="LiveId" clId="{83311C7E-2833-415D-A3A7-B0ACE7C88196}" dt="2020-04-18T16:49:58.687" v="262" actId="478"/>
+          <ac:spMkLst>
+            <pc:docMk/>
+            <pc:sldMk cId="2686133521" sldId="259"/>
+            <ac:spMk id="107" creationId="{30BD3A2F-8EAC-4875-9287-44C27E26B17B}"/>
+          </ac:spMkLst>
+        </pc:spChg>
+        <pc:spChg chg="add del mod">
+          <ac:chgData name="Meaghan Winder" userId="e7dbd1f288b20f78" providerId="LiveId" clId="{83311C7E-2833-415D-A3A7-B0ACE7C88196}" dt="2020-04-18T16:49:58.687" v="262" actId="478"/>
+          <ac:spMkLst>
+            <pc:docMk/>
+            <pc:sldMk cId="2686133521" sldId="259"/>
+            <ac:spMk id="108" creationId="{FF7B4602-F221-4418-9103-075E429526F2}"/>
+          </ac:spMkLst>
+        </pc:spChg>
+        <pc:cxnChg chg="del mod">
+          <ac:chgData name="Meaghan Winder" userId="e7dbd1f288b20f78" providerId="LiveId" clId="{83311C7E-2833-415D-A3A7-B0ACE7C88196}" dt="2020-04-11T22:29:42.144" v="168" actId="478"/>
+          <ac:cxnSpMkLst>
+            <pc:docMk/>
+            <pc:sldMk cId="2686133521" sldId="259"/>
+            <ac:cxnSpMk id="21" creationId="{AD692655-DD5E-4A9E-A3A2-BEF23FDD0A1C}"/>
+          </ac:cxnSpMkLst>
+        </pc:cxnChg>
+        <pc:cxnChg chg="del mod">
+          <ac:chgData name="Meaghan Winder" userId="e7dbd1f288b20f78" providerId="LiveId" clId="{83311C7E-2833-415D-A3A7-B0ACE7C88196}" dt="2020-04-11T22:29:40.876" v="167" actId="478"/>
+          <ac:cxnSpMkLst>
+            <pc:docMk/>
+            <pc:sldMk cId="2686133521" sldId="259"/>
+            <ac:cxnSpMk id="22" creationId="{48342EC8-BD99-4F76-B742-8E1D1A3E35A0}"/>
+          </ac:cxnSpMkLst>
+        </pc:cxnChg>
+        <pc:cxnChg chg="del mod">
+          <ac:chgData name="Meaghan Winder" userId="e7dbd1f288b20f78" providerId="LiveId" clId="{83311C7E-2833-415D-A3A7-B0ACE7C88196}" dt="2020-04-11T22:29:24.584" v="162" actId="478"/>
+          <ac:cxnSpMkLst>
+            <pc:docMk/>
+            <pc:sldMk cId="2686133521" sldId="259"/>
+            <ac:cxnSpMk id="27" creationId="{3F6F17A5-E22E-46E6-93B3-5EEA2BDB4C4B}"/>
+          </ac:cxnSpMkLst>
+        </pc:cxnChg>
+        <pc:cxnChg chg="del mod">
+          <ac:chgData name="Meaghan Winder" userId="e7dbd1f288b20f78" providerId="LiveId" clId="{83311C7E-2833-415D-A3A7-B0ACE7C88196}" dt="2020-04-11T22:29:23.057" v="161" actId="478"/>
+          <ac:cxnSpMkLst>
+            <pc:docMk/>
+            <pc:sldMk cId="2686133521" sldId="259"/>
+            <ac:cxnSpMk id="28" creationId="{914C1056-9EB3-4F77-A65F-3708669C9558}"/>
+          </ac:cxnSpMkLst>
+        </pc:cxnChg>
+        <pc:cxnChg chg="add del mod">
+          <ac:chgData name="Meaghan Winder" userId="e7dbd1f288b20f78" providerId="LiveId" clId="{83311C7E-2833-415D-A3A7-B0ACE7C88196}" dt="2020-04-11T22:30:54.912" v="182" actId="478"/>
+          <ac:cxnSpMkLst>
+            <pc:docMk/>
+            <pc:sldMk cId="2686133521" sldId="259"/>
+            <ac:cxnSpMk id="38" creationId="{882B8466-3A9E-4E9D-B074-428A27CDE048}"/>
+          </ac:cxnSpMkLst>
+        </pc:cxnChg>
+        <pc:cxnChg chg="add del mod">
+          <ac:chgData name="Meaghan Winder" userId="e7dbd1f288b20f78" providerId="LiveId" clId="{83311C7E-2833-415D-A3A7-B0ACE7C88196}" dt="2020-04-11T22:30:54.912" v="182" actId="478"/>
+          <ac:cxnSpMkLst>
+            <pc:docMk/>
+            <pc:sldMk cId="2686133521" sldId="259"/>
+            <ac:cxnSpMk id="39" creationId="{D45E3CD9-1A6A-425A-BF81-7E1247EA8F72}"/>
+          </ac:cxnSpMkLst>
+        </pc:cxnChg>
+        <pc:cxnChg chg="add del mod">
+          <ac:chgData name="Meaghan Winder" userId="e7dbd1f288b20f78" providerId="LiveId" clId="{83311C7E-2833-415D-A3A7-B0ACE7C88196}" dt="2020-04-11T22:30:54.912" v="182" actId="478"/>
+          <ac:cxnSpMkLst>
+            <pc:docMk/>
+            <pc:sldMk cId="2686133521" sldId="259"/>
+            <ac:cxnSpMk id="40" creationId="{A99C2EE2-08F0-4DC3-927C-768D80CA8055}"/>
+          </ac:cxnSpMkLst>
+        </pc:cxnChg>
+        <pc:cxnChg chg="add del mod">
+          <ac:chgData name="Meaghan Winder" userId="e7dbd1f288b20f78" providerId="LiveId" clId="{83311C7E-2833-415D-A3A7-B0ACE7C88196}" dt="2020-04-11T22:30:54.912" v="182" actId="478"/>
+          <ac:cxnSpMkLst>
+            <pc:docMk/>
+            <pc:sldMk cId="2686133521" sldId="259"/>
+            <ac:cxnSpMk id="41" creationId="{968D7729-9FAD-43F8-9E8F-9B7DB6E7F91E}"/>
+          </ac:cxnSpMkLst>
+        </pc:cxnChg>
+        <pc:cxnChg chg="add del mod">
+          <ac:chgData name="Meaghan Winder" userId="e7dbd1f288b20f78" providerId="LiveId" clId="{83311C7E-2833-415D-A3A7-B0ACE7C88196}" dt="2020-04-11T22:30:54.912" v="182" actId="478"/>
+          <ac:cxnSpMkLst>
+            <pc:docMk/>
+            <pc:sldMk cId="2686133521" sldId="259"/>
+            <ac:cxnSpMk id="42" creationId="{D72D4D5F-479E-4951-B339-1661A03B3745}"/>
+          </ac:cxnSpMkLst>
+        </pc:cxnChg>
+        <pc:cxnChg chg="add del mod">
+          <ac:chgData name="Meaghan Winder" userId="e7dbd1f288b20f78" providerId="LiveId" clId="{83311C7E-2833-415D-A3A7-B0ACE7C88196}" dt="2020-04-11T22:30:54.912" v="182" actId="478"/>
+          <ac:cxnSpMkLst>
+            <pc:docMk/>
+            <pc:sldMk cId="2686133521" sldId="259"/>
+            <ac:cxnSpMk id="43" creationId="{5607CB67-ECBA-479C-B03B-4D11D0C69543}"/>
+          </ac:cxnSpMkLst>
+        </pc:cxnChg>
+        <pc:cxnChg chg="add del mod">
+          <ac:chgData name="Meaghan Winder" userId="e7dbd1f288b20f78" providerId="LiveId" clId="{83311C7E-2833-415D-A3A7-B0ACE7C88196}" dt="2020-04-11T22:30:54.912" v="182" actId="478"/>
+          <ac:cxnSpMkLst>
+            <pc:docMk/>
+            <pc:sldMk cId="2686133521" sldId="259"/>
+            <ac:cxnSpMk id="44" creationId="{90F767F3-FF8C-4364-8599-C303B5E33614}"/>
+          </ac:cxnSpMkLst>
+        </pc:cxnChg>
+        <pc:cxnChg chg="add del mod">
+          <ac:chgData name="Meaghan Winder" userId="e7dbd1f288b20f78" providerId="LiveId" clId="{83311C7E-2833-415D-A3A7-B0ACE7C88196}" dt="2020-04-11T22:30:54.912" v="182" actId="478"/>
+          <ac:cxnSpMkLst>
+            <pc:docMk/>
+            <pc:sldMk cId="2686133521" sldId="259"/>
+            <ac:cxnSpMk id="45" creationId="{ED7CCB98-8FD3-41DA-823D-FC462C5BD346}"/>
+          </ac:cxnSpMkLst>
+        </pc:cxnChg>
+        <pc:cxnChg chg="add del mod">
+          <ac:chgData name="Meaghan Winder" userId="e7dbd1f288b20f78" providerId="LiveId" clId="{83311C7E-2833-415D-A3A7-B0ACE7C88196}" dt="2020-04-11T22:30:54.912" v="182" actId="478"/>
+          <ac:cxnSpMkLst>
+            <pc:docMk/>
+            <pc:sldMk cId="2686133521" sldId="259"/>
+            <ac:cxnSpMk id="52" creationId="{E56D9E8B-5C61-4170-9535-1EAAD301B2DA}"/>
+          </ac:cxnSpMkLst>
+        </pc:cxnChg>
+        <pc:cxnChg chg="add del mod">
+          <ac:chgData name="Meaghan Winder" userId="e7dbd1f288b20f78" providerId="LiveId" clId="{83311C7E-2833-415D-A3A7-B0ACE7C88196}" dt="2020-04-11T22:30:54.912" v="182" actId="478"/>
+          <ac:cxnSpMkLst>
+            <pc:docMk/>
+            <pc:sldMk cId="2686133521" sldId="259"/>
+            <ac:cxnSpMk id="53" creationId="{95729137-D97D-4EC2-A9D2-E0EDABB51268}"/>
+          </ac:cxnSpMkLst>
+        </pc:cxnChg>
+        <pc:cxnChg chg="add del mod">
+          <ac:chgData name="Meaghan Winder" userId="e7dbd1f288b20f78" providerId="LiveId" clId="{83311C7E-2833-415D-A3A7-B0ACE7C88196}" dt="2020-04-11T22:30:54.912" v="182" actId="478"/>
+          <ac:cxnSpMkLst>
+            <pc:docMk/>
+            <pc:sldMk cId="2686133521" sldId="259"/>
+            <ac:cxnSpMk id="54" creationId="{E4AE64A3-3C3B-4721-9B6D-14BE9F79B308}"/>
+          </ac:cxnSpMkLst>
+        </pc:cxnChg>
+        <pc:cxnChg chg="add del mod">
+          <ac:chgData name="Meaghan Winder" userId="e7dbd1f288b20f78" providerId="LiveId" clId="{83311C7E-2833-415D-A3A7-B0ACE7C88196}" dt="2020-04-11T22:30:54.912" v="182" actId="478"/>
+          <ac:cxnSpMkLst>
+            <pc:docMk/>
+            <pc:sldMk cId="2686133521" sldId="259"/>
+            <ac:cxnSpMk id="55" creationId="{A9743A18-F213-48EA-9874-7A632787FE2C}"/>
+          </ac:cxnSpMkLst>
+        </pc:cxnChg>
+        <pc:cxnChg chg="add">
+          <ac:chgData name="Meaghan Winder" userId="e7dbd1f288b20f78" providerId="LiveId" clId="{83311C7E-2833-415D-A3A7-B0ACE7C88196}" dt="2020-04-11T22:31:05.117" v="184"/>
+          <ac:cxnSpMkLst>
+            <pc:docMk/>
+            <pc:sldMk cId="2686133521" sldId="259"/>
+            <ac:cxnSpMk id="95" creationId="{F0DAA144-29CD-43CB-B7FC-2EAF95AE0A82}"/>
+          </ac:cxnSpMkLst>
+        </pc:cxnChg>
+        <pc:cxnChg chg="add">
+          <ac:chgData name="Meaghan Winder" userId="e7dbd1f288b20f78" providerId="LiveId" clId="{83311C7E-2833-415D-A3A7-B0ACE7C88196}" dt="2020-04-11T22:31:05.117" v="184"/>
+          <ac:cxnSpMkLst>
+            <pc:docMk/>
+            <pc:sldMk cId="2686133521" sldId="259"/>
+            <ac:cxnSpMk id="96" creationId="{4C19282E-ACC0-4BE4-8737-091DA9FD63B8}"/>
+          </ac:cxnSpMkLst>
+        </pc:cxnChg>
+        <pc:cxnChg chg="add del mod">
+          <ac:chgData name="Meaghan Winder" userId="e7dbd1f288b20f78" providerId="LiveId" clId="{83311C7E-2833-415D-A3A7-B0ACE7C88196}" dt="2020-04-18T16:49:58.687" v="262" actId="478"/>
+          <ac:cxnSpMkLst>
+            <pc:docMk/>
+            <pc:sldMk cId="2686133521" sldId="259"/>
+            <ac:cxnSpMk id="97" creationId="{7F0EBAAE-1D02-47EF-915B-FC1420FCC632}"/>
+          </ac:cxnSpMkLst>
+        </pc:cxnChg>
+        <pc:cxnChg chg="add del mod">
+          <ac:chgData name="Meaghan Winder" userId="e7dbd1f288b20f78" providerId="LiveId" clId="{83311C7E-2833-415D-A3A7-B0ACE7C88196}" dt="2020-04-18T16:49:58.687" v="262" actId="478"/>
+          <ac:cxnSpMkLst>
+            <pc:docMk/>
+            <pc:sldMk cId="2686133521" sldId="259"/>
+            <ac:cxnSpMk id="98" creationId="{5125FFB0-F7E6-4CA6-A785-AA100A331AFE}"/>
+          </ac:cxnSpMkLst>
+        </pc:cxnChg>
+        <pc:cxnChg chg="add del mod">
+          <ac:chgData name="Meaghan Winder" userId="e7dbd1f288b20f78" providerId="LiveId" clId="{83311C7E-2833-415D-A3A7-B0ACE7C88196}" dt="2020-04-18T16:49:58.687" v="262" actId="478"/>
+          <ac:cxnSpMkLst>
+            <pc:docMk/>
+            <pc:sldMk cId="2686133521" sldId="259"/>
+            <ac:cxnSpMk id="99" creationId="{13CEDAA0-67BC-4C00-9CB9-F2E82D53BEE2}"/>
+          </ac:cxnSpMkLst>
+        </pc:cxnChg>
+        <pc:cxnChg chg="add del mod">
+          <ac:chgData name="Meaghan Winder" userId="e7dbd1f288b20f78" providerId="LiveId" clId="{83311C7E-2833-415D-A3A7-B0ACE7C88196}" dt="2020-04-18T16:49:58.687" v="262" actId="478"/>
+          <ac:cxnSpMkLst>
+            <pc:docMk/>
+            <pc:sldMk cId="2686133521" sldId="259"/>
+            <ac:cxnSpMk id="100" creationId="{DE734409-DC84-4D53-B8ED-C527C1B51193}"/>
+          </ac:cxnSpMkLst>
+        </pc:cxnChg>
+        <pc:cxnChg chg="add">
+          <ac:chgData name="Meaghan Winder" userId="e7dbd1f288b20f78" providerId="LiveId" clId="{83311C7E-2833-415D-A3A7-B0ACE7C88196}" dt="2020-04-11T22:31:05.117" v="184"/>
+          <ac:cxnSpMkLst>
+            <pc:docMk/>
+            <pc:sldMk cId="2686133521" sldId="259"/>
+            <ac:cxnSpMk id="101" creationId="{179E6489-586D-4269-B4BA-379BB5E80AF9}"/>
+          </ac:cxnSpMkLst>
+        </pc:cxnChg>
+        <pc:cxnChg chg="add">
+          <ac:chgData name="Meaghan Winder" userId="e7dbd1f288b20f78" providerId="LiveId" clId="{83311C7E-2833-415D-A3A7-B0ACE7C88196}" dt="2020-04-11T22:31:05.117" v="184"/>
+          <ac:cxnSpMkLst>
+            <pc:docMk/>
+            <pc:sldMk cId="2686133521" sldId="259"/>
+            <ac:cxnSpMk id="102" creationId="{1EDA9D5F-2C0C-42F2-90A6-85CC534E570C}"/>
+          </ac:cxnSpMkLst>
+        </pc:cxnChg>
+        <pc:cxnChg chg="add del mod">
+          <ac:chgData name="Meaghan Winder" userId="e7dbd1f288b20f78" providerId="LiveId" clId="{83311C7E-2833-415D-A3A7-B0ACE7C88196}" dt="2020-04-18T16:49:58.687" v="262" actId="478"/>
+          <ac:cxnSpMkLst>
+            <pc:docMk/>
+            <pc:sldMk cId="2686133521" sldId="259"/>
+            <ac:cxnSpMk id="109" creationId="{ED947F64-F6A1-46E8-BC19-A8AECDD185D6}"/>
+          </ac:cxnSpMkLst>
+        </pc:cxnChg>
+        <pc:cxnChg chg="add del mod">
+          <ac:chgData name="Meaghan Winder" userId="e7dbd1f288b20f78" providerId="LiveId" clId="{83311C7E-2833-415D-A3A7-B0ACE7C88196}" dt="2020-04-18T16:49:58.687" v="262" actId="478"/>
+          <ac:cxnSpMkLst>
+            <pc:docMk/>
+            <pc:sldMk cId="2686133521" sldId="259"/>
+            <ac:cxnSpMk id="110" creationId="{46149763-4694-4468-9B28-DD8FC690DF8E}"/>
+          </ac:cxnSpMkLst>
+        </pc:cxnChg>
+        <pc:cxnChg chg="add del mod">
+          <ac:chgData name="Meaghan Winder" userId="e7dbd1f288b20f78" providerId="LiveId" clId="{83311C7E-2833-415D-A3A7-B0ACE7C88196}" dt="2020-04-18T16:49:58.687" v="262" actId="478"/>
+          <ac:cxnSpMkLst>
+            <pc:docMk/>
+            <pc:sldMk cId="2686133521" sldId="259"/>
+            <ac:cxnSpMk id="111" creationId="{6A7FC079-B762-458B-98CD-53C6B173B09B}"/>
+          </ac:cxnSpMkLst>
+        </pc:cxnChg>
+        <pc:cxnChg chg="add del mod">
+          <ac:chgData name="Meaghan Winder" userId="e7dbd1f288b20f78" providerId="LiveId" clId="{83311C7E-2833-415D-A3A7-B0ACE7C88196}" dt="2020-04-18T16:49:58.687" v="262" actId="478"/>
+          <ac:cxnSpMkLst>
+            <pc:docMk/>
+            <pc:sldMk cId="2686133521" sldId="259"/>
+            <ac:cxnSpMk id="112" creationId="{68627BB7-A1D7-408E-9FBA-B7FE0EB3E790}"/>
+          </ac:cxnSpMkLst>
+        </pc:cxnChg>
       </pc:sldChg>
     </pc:docChg>
   </pc:docChgLst>
@@ -1268,7 +1971,7 @@
           <a:p>
             <a:fld id="{9361BDE8-822D-4694-8B11-BB9F03B17CFA}" type="datetimeFigureOut">
               <a:rPr lang="en-US" smtClean="0"/>
-              <a:t>3/23/2020</a:t>
+              <a:t>4/18/2020</a:t>
             </a:fld>
             <a:endParaRPr lang="en-US"/>
           </a:p>
@@ -1466,7 +2169,7 @@
           <a:p>
             <a:fld id="{9361BDE8-822D-4694-8B11-BB9F03B17CFA}" type="datetimeFigureOut">
               <a:rPr lang="en-US" smtClean="0"/>
-              <a:t>3/23/2020</a:t>
+              <a:t>4/18/2020</a:t>
             </a:fld>
             <a:endParaRPr lang="en-US"/>
           </a:p>
@@ -1674,7 +2377,7 @@
           <a:p>
             <a:fld id="{9361BDE8-822D-4694-8B11-BB9F03B17CFA}" type="datetimeFigureOut">
               <a:rPr lang="en-US" smtClean="0"/>
-              <a:t>3/23/2020</a:t>
+              <a:t>4/18/2020</a:t>
             </a:fld>
             <a:endParaRPr lang="en-US"/>
           </a:p>
@@ -1872,7 +2575,7 @@
           <a:p>
             <a:fld id="{9361BDE8-822D-4694-8B11-BB9F03B17CFA}" type="datetimeFigureOut">
               <a:rPr lang="en-US" smtClean="0"/>
-              <a:t>3/23/2020</a:t>
+              <a:t>4/18/2020</a:t>
             </a:fld>
             <a:endParaRPr lang="en-US"/>
           </a:p>
@@ -2147,7 +2850,7 @@
           <a:p>
             <a:fld id="{9361BDE8-822D-4694-8B11-BB9F03B17CFA}" type="datetimeFigureOut">
               <a:rPr lang="en-US" smtClean="0"/>
-              <a:t>3/23/2020</a:t>
+              <a:t>4/18/2020</a:t>
             </a:fld>
             <a:endParaRPr lang="en-US"/>
           </a:p>
@@ -2412,7 +3115,7 @@
           <a:p>
             <a:fld id="{9361BDE8-822D-4694-8B11-BB9F03B17CFA}" type="datetimeFigureOut">
               <a:rPr lang="en-US" smtClean="0"/>
-              <a:t>3/23/2020</a:t>
+              <a:t>4/18/2020</a:t>
             </a:fld>
             <a:endParaRPr lang="en-US"/>
           </a:p>
@@ -2824,7 +3527,7 @@
           <a:p>
             <a:fld id="{9361BDE8-822D-4694-8B11-BB9F03B17CFA}" type="datetimeFigureOut">
               <a:rPr lang="en-US" smtClean="0"/>
-              <a:t>3/23/2020</a:t>
+              <a:t>4/18/2020</a:t>
             </a:fld>
             <a:endParaRPr lang="en-US"/>
           </a:p>
@@ -2965,7 +3668,7 @@
           <a:p>
             <a:fld id="{9361BDE8-822D-4694-8B11-BB9F03B17CFA}" type="datetimeFigureOut">
               <a:rPr lang="en-US" smtClean="0"/>
-              <a:t>3/23/2020</a:t>
+              <a:t>4/18/2020</a:t>
             </a:fld>
             <a:endParaRPr lang="en-US"/>
           </a:p>
@@ -3078,7 +3781,7 @@
           <a:p>
             <a:fld id="{9361BDE8-822D-4694-8B11-BB9F03B17CFA}" type="datetimeFigureOut">
               <a:rPr lang="en-US" smtClean="0"/>
-              <a:t>3/23/2020</a:t>
+              <a:t>4/18/2020</a:t>
             </a:fld>
             <a:endParaRPr lang="en-US"/>
           </a:p>
@@ -3389,7 +4092,7 @@
           <a:p>
             <a:fld id="{9361BDE8-822D-4694-8B11-BB9F03B17CFA}" type="datetimeFigureOut">
               <a:rPr lang="en-US" smtClean="0"/>
-              <a:t>3/23/2020</a:t>
+              <a:t>4/18/2020</a:t>
             </a:fld>
             <a:endParaRPr lang="en-US"/>
           </a:p>
@@ -3677,7 +4380,7 @@
           <a:p>
             <a:fld id="{9361BDE8-822D-4694-8B11-BB9F03B17CFA}" type="datetimeFigureOut">
               <a:rPr lang="en-US" smtClean="0"/>
-              <a:t>3/23/2020</a:t>
+              <a:t>4/18/2020</a:t>
             </a:fld>
             <a:endParaRPr lang="en-US"/>
           </a:p>
@@ -3918,7 +4621,7 @@
           <a:p>
             <a:fld id="{9361BDE8-822D-4694-8B11-BB9F03B17CFA}" type="datetimeFigureOut">
               <a:rPr lang="en-US" smtClean="0"/>
-              <a:t>3/23/2020</a:t>
+              <a:t>4/18/2020</a:t>
             </a:fld>
             <a:endParaRPr lang="en-US"/>
           </a:p>
@@ -6478,10 +7181,10 @@
       </p:grpSpPr>
       <p:sp>
         <p:nvSpPr>
-          <p:cNvPr id="6" name="TextBox 5">
-            <a:extLst>
-              <a:ext uri="{FF2B5EF4-FFF2-40B4-BE49-F238E27FC236}">
-                <a16:creationId xmlns:a16="http://schemas.microsoft.com/office/drawing/2014/main" id="{4F72032D-0F02-4938-BAB1-C82DBF53198D}"/>
+          <p:cNvPr id="79" name="TextBox 78">
+            <a:extLst>
+              <a:ext uri="{FF2B5EF4-FFF2-40B4-BE49-F238E27FC236}">
+                <a16:creationId xmlns:a16="http://schemas.microsoft.com/office/drawing/2014/main" id="{ADA8B93A-DD2D-4B4A-A408-5789D44A879A}"/>
               </a:ext>
             </a:extLst>
           </p:cNvPr>
@@ -6490,8 +7193,8 @@
         </p:nvSpPr>
         <p:spPr>
           <a:xfrm>
-            <a:off x="6933753" y="2938028"/>
-            <a:ext cx="482824" cy="307777"/>
+            <a:off x="8251877" y="2188527"/>
+            <a:ext cx="769257" cy="307777"/>
           </a:xfrm>
           <a:prstGeom prst="rect">
             <a:avLst/>
@@ -6499,7 +7202,7 @@
           <a:noFill/>
         </p:spPr>
         <p:txBody>
-          <a:bodyPr wrap="none" rtlCol="0">
+          <a:bodyPr wrap="square" rtlCol="0">
             <a:spAutoFit/>
           </a:bodyPr>
           <a:lstStyle/>
@@ -6509,17 +7212,17 @@
               <a:rPr lang="en-US" sz="1400" dirty="0">
                 <a:latin typeface="cmr10" panose="020B0500000000000000" pitchFamily="34" charset="0"/>
               </a:rPr>
-              <a:t>Site</a:t>
-            </a:r>
-          </a:p>
-        </p:txBody>
-      </p:sp>
-      <p:sp>
-        <p:nvSpPr>
-          <p:cNvPr id="7" name="TextBox 6">
-            <a:extLst>
-              <a:ext uri="{FF2B5EF4-FFF2-40B4-BE49-F238E27FC236}">
-                <a16:creationId xmlns:a16="http://schemas.microsoft.com/office/drawing/2014/main" id="{A94C2E2F-CD36-4302-87FB-04F2D5D191A8}"/>
+              <a:t>Lake</a:t>
+            </a:r>
+          </a:p>
+        </p:txBody>
+      </p:sp>
+      <p:sp>
+        <p:nvSpPr>
+          <p:cNvPr id="80" name="TextBox 79">
+            <a:extLst>
+              <a:ext uri="{FF2B5EF4-FFF2-40B4-BE49-F238E27FC236}">
+                <a16:creationId xmlns:a16="http://schemas.microsoft.com/office/drawing/2014/main" id="{04E29E8A-08DD-4D82-B2F6-C9733330964A}"/>
               </a:ext>
             </a:extLst>
           </p:cNvPr>
@@ -6528,8 +7231,8 @@
         </p:nvSpPr>
         <p:spPr>
           <a:xfrm>
-            <a:off x="8454405" y="2919489"/>
-            <a:ext cx="364203" cy="307777"/>
+            <a:off x="6620368" y="2938028"/>
+            <a:ext cx="1109599" cy="307777"/>
           </a:xfrm>
           <a:prstGeom prst="rect">
             <a:avLst/>
@@ -6547,17 +7250,17 @@
               <a:rPr lang="en-US" sz="1400" dirty="0">
                 <a:latin typeface="cmr10" panose="020B0500000000000000" pitchFamily="34" charset="0"/>
               </a:rPr>
-              <a:t>…</a:t>
-            </a:r>
-          </a:p>
-        </p:txBody>
-      </p:sp>
-      <p:sp>
-        <p:nvSpPr>
-          <p:cNvPr id="8" name="TextBox 7">
-            <a:extLst>
-              <a:ext uri="{FF2B5EF4-FFF2-40B4-BE49-F238E27FC236}">
-                <a16:creationId xmlns:a16="http://schemas.microsoft.com/office/drawing/2014/main" id="{9A2508D2-99AB-45C9-991C-7B6326382FD8}"/>
+              <a:t>Sample Site</a:t>
+            </a:r>
+          </a:p>
+        </p:txBody>
+      </p:sp>
+      <p:sp>
+        <p:nvSpPr>
+          <p:cNvPr id="81" name="TextBox 80">
+            <a:extLst>
+              <a:ext uri="{FF2B5EF4-FFF2-40B4-BE49-F238E27FC236}">
+                <a16:creationId xmlns:a16="http://schemas.microsoft.com/office/drawing/2014/main" id="{199982C2-DDA1-43AB-B0B6-929919D831F4}"/>
               </a:ext>
             </a:extLst>
           </p:cNvPr>
@@ -6566,8 +7269,8 @@
         </p:nvSpPr>
         <p:spPr>
           <a:xfrm>
-            <a:off x="9856431" y="2919488"/>
-            <a:ext cx="482824" cy="307777"/>
+            <a:off x="8454405" y="2919489"/>
+            <a:ext cx="364203" cy="307777"/>
           </a:xfrm>
           <a:prstGeom prst="rect">
             <a:avLst/>
@@ -6585,17 +7288,17 @@
               <a:rPr lang="en-US" sz="1400" dirty="0">
                 <a:latin typeface="cmr10" panose="020B0500000000000000" pitchFamily="34" charset="0"/>
               </a:rPr>
-              <a:t>Site</a:t>
-            </a:r>
-          </a:p>
-        </p:txBody>
-      </p:sp>
-      <p:sp>
-        <p:nvSpPr>
-          <p:cNvPr id="10" name="TextBox 9">
-            <a:extLst>
-              <a:ext uri="{FF2B5EF4-FFF2-40B4-BE49-F238E27FC236}">
-                <a16:creationId xmlns:a16="http://schemas.microsoft.com/office/drawing/2014/main" id="{2FEE30CC-B088-486B-A2DF-64261DF910C9}"/>
+              <a:t>…</a:t>
+            </a:r>
+          </a:p>
+        </p:txBody>
+      </p:sp>
+      <p:sp>
+        <p:nvSpPr>
+          <p:cNvPr id="82" name="TextBox 81">
+            <a:extLst>
+              <a:ext uri="{FF2B5EF4-FFF2-40B4-BE49-F238E27FC236}">
+                <a16:creationId xmlns:a16="http://schemas.microsoft.com/office/drawing/2014/main" id="{C3C89471-D961-4EFF-BCCF-04B48FE33390}"/>
               </a:ext>
             </a:extLst>
           </p:cNvPr>
@@ -6604,8 +7307,8 @@
         </p:nvSpPr>
         <p:spPr>
           <a:xfrm>
-            <a:off x="8941583" y="3849559"/>
-            <a:ext cx="752129" cy="307777"/>
+            <a:off x="9543046" y="2919488"/>
+            <a:ext cx="1109599" cy="307777"/>
           </a:xfrm>
           <a:prstGeom prst="rect">
             <a:avLst/>
@@ -6618,6 +7321,44 @@
           </a:bodyPr>
           <a:lstStyle/>
           <a:p>
+            <a:pPr algn="ctr"/>
+            <a:r>
+              <a:rPr lang="en-US" sz="1400" dirty="0">
+                <a:latin typeface="cmr10" panose="020B0500000000000000" pitchFamily="34" charset="0"/>
+              </a:rPr>
+              <a:t>Sample Site</a:t>
+            </a:r>
+          </a:p>
+        </p:txBody>
+      </p:sp>
+      <p:sp>
+        <p:nvSpPr>
+          <p:cNvPr id="84" name="TextBox 83">
+            <a:extLst>
+              <a:ext uri="{FF2B5EF4-FFF2-40B4-BE49-F238E27FC236}">
+                <a16:creationId xmlns:a16="http://schemas.microsoft.com/office/drawing/2014/main" id="{533B03F3-F6CB-4250-A1A5-39AD70495F11}"/>
+              </a:ext>
+            </a:extLst>
+          </p:cNvPr>
+          <p:cNvSpPr txBox="1"/>
+          <p:nvPr/>
+        </p:nvSpPr>
+        <p:spPr>
+          <a:xfrm>
+            <a:off x="8941583" y="3849559"/>
+            <a:ext cx="752129" cy="307777"/>
+          </a:xfrm>
+          <a:prstGeom prst="rect">
+            <a:avLst/>
+          </a:prstGeom>
+          <a:noFill/>
+        </p:spPr>
+        <p:txBody>
+          <a:bodyPr wrap="none" rtlCol="0">
+            <a:spAutoFit/>
+          </a:bodyPr>
+          <a:lstStyle/>
+          <a:p>
             <a:r>
               <a:rPr lang="en-US" sz="1400" dirty="0">
                 <a:latin typeface="cmr10" panose="020B0500000000000000" pitchFamily="34" charset="0"/>
@@ -6629,10 +7370,10 @@
       </p:sp>
       <p:sp>
         <p:nvSpPr>
-          <p:cNvPr id="11" name="TextBox 10">
-            <a:extLst>
-              <a:ext uri="{FF2B5EF4-FFF2-40B4-BE49-F238E27FC236}">
-                <a16:creationId xmlns:a16="http://schemas.microsoft.com/office/drawing/2014/main" id="{D9E98563-D76B-4483-85F9-BA7E350CEED0}"/>
+          <p:cNvPr id="85" name="TextBox 84">
+            <a:extLst>
+              <a:ext uri="{FF2B5EF4-FFF2-40B4-BE49-F238E27FC236}">
+                <a16:creationId xmlns:a16="http://schemas.microsoft.com/office/drawing/2014/main" id="{49A91055-103F-4E26-8DB5-07A2C2115C86}"/>
               </a:ext>
             </a:extLst>
           </p:cNvPr>
@@ -6666,10 +7407,10 @@
       </p:sp>
       <p:sp>
         <p:nvSpPr>
-          <p:cNvPr id="12" name="TextBox 11">
-            <a:extLst>
-              <a:ext uri="{FF2B5EF4-FFF2-40B4-BE49-F238E27FC236}">
-                <a16:creationId xmlns:a16="http://schemas.microsoft.com/office/drawing/2014/main" id="{4C8F7575-6EC9-4A4C-BDD9-0306F1AA662C}"/>
+          <p:cNvPr id="86" name="TextBox 85">
+            <a:extLst>
+              <a:ext uri="{FF2B5EF4-FFF2-40B4-BE49-F238E27FC236}">
+                <a16:creationId xmlns:a16="http://schemas.microsoft.com/office/drawing/2014/main" id="{BD768D00-B6AF-40BB-AB70-867A5D1072C3}"/>
               </a:ext>
             </a:extLst>
           </p:cNvPr>
@@ -6703,10 +7444,10 @@
       </p:sp>
       <p:sp>
         <p:nvSpPr>
-          <p:cNvPr id="15" name="TextBox 14">
-            <a:extLst>
-              <a:ext uri="{FF2B5EF4-FFF2-40B4-BE49-F238E27FC236}">
-                <a16:creationId xmlns:a16="http://schemas.microsoft.com/office/drawing/2014/main" id="{2D8FB126-796E-4E04-9C6B-E125E0A6967D}"/>
+          <p:cNvPr id="89" name="TextBox 88">
+            <a:extLst>
+              <a:ext uri="{FF2B5EF4-FFF2-40B4-BE49-F238E27FC236}">
+                <a16:creationId xmlns:a16="http://schemas.microsoft.com/office/drawing/2014/main" id="{2661F273-36DF-4138-BAF0-4654A485A96C}"/>
               </a:ext>
             </a:extLst>
           </p:cNvPr>
@@ -6740,10 +7481,10 @@
       </p:sp>
       <p:sp>
         <p:nvSpPr>
-          <p:cNvPr id="16" name="TextBox 15">
-            <a:extLst>
-              <a:ext uri="{FF2B5EF4-FFF2-40B4-BE49-F238E27FC236}">
-                <a16:creationId xmlns:a16="http://schemas.microsoft.com/office/drawing/2014/main" id="{3A476F38-7B84-479B-83DF-9B39F8C2FA95}"/>
+          <p:cNvPr id="90" name="TextBox 89">
+            <a:extLst>
+              <a:ext uri="{FF2B5EF4-FFF2-40B4-BE49-F238E27FC236}">
+                <a16:creationId xmlns:a16="http://schemas.microsoft.com/office/drawing/2014/main" id="{C4148CDA-266C-418F-9BF9-1DFFDA6DDA0B}"/>
               </a:ext>
             </a:extLst>
           </p:cNvPr>
@@ -6777,10 +7518,10 @@
       </p:sp>
       <p:sp>
         <p:nvSpPr>
-          <p:cNvPr id="17" name="TextBox 16">
-            <a:extLst>
-              <a:ext uri="{FF2B5EF4-FFF2-40B4-BE49-F238E27FC236}">
-                <a16:creationId xmlns:a16="http://schemas.microsoft.com/office/drawing/2014/main" id="{F6FA13F2-830A-4C4E-95BB-ACF9F774F520}"/>
+          <p:cNvPr id="91" name="TextBox 90">
+            <a:extLst>
+              <a:ext uri="{FF2B5EF4-FFF2-40B4-BE49-F238E27FC236}">
+                <a16:creationId xmlns:a16="http://schemas.microsoft.com/office/drawing/2014/main" id="{E46A55F6-5DC9-4035-8A2E-5F588D4D8716}"/>
               </a:ext>
             </a:extLst>
           </p:cNvPr>
@@ -6814,24 +7555,24 @@
       </p:sp>
       <p:cxnSp>
         <p:nvCxnSpPr>
-          <p:cNvPr id="21" name="Straight Arrow Connector 20">
-            <a:extLst>
-              <a:ext uri="{FF2B5EF4-FFF2-40B4-BE49-F238E27FC236}">
-                <a16:creationId xmlns:a16="http://schemas.microsoft.com/office/drawing/2014/main" id="{AD692655-DD5E-4A9E-A3A2-BEF23FDD0A1C}"/>
+          <p:cNvPr id="95" name="Straight Arrow Connector 94">
+            <a:extLst>
+              <a:ext uri="{FF2B5EF4-FFF2-40B4-BE49-F238E27FC236}">
+                <a16:creationId xmlns:a16="http://schemas.microsoft.com/office/drawing/2014/main" id="{F0DAA144-29CD-43CB-B7FC-2EAF95AE0A82}"/>
               </a:ext>
             </a:extLst>
           </p:cNvPr>
           <p:cNvCxnSpPr>
             <a:cxnSpLocks/>
-            <a:stCxn id="6" idx="2"/>
-            <a:endCxn id="16" idx="0"/>
+            <a:stCxn id="80" idx="2"/>
+            <a:endCxn id="90" idx="0"/>
           </p:cNvCxnSpPr>
           <p:nvPr/>
         </p:nvCxnSpPr>
         <p:spPr>
           <a:xfrm>
-            <a:off x="7175165" y="3245805"/>
-            <a:ext cx="809347" cy="597683"/>
+            <a:off x="7175168" y="3245805"/>
+            <a:ext cx="809344" cy="597683"/>
           </a:xfrm>
           <a:prstGeom prst="straightConnector1">
             <a:avLst/>
@@ -6857,24 +7598,24 @@
       </p:cxnSp>
       <p:cxnSp>
         <p:nvCxnSpPr>
-          <p:cNvPr id="22" name="Straight Arrow Connector 21">
-            <a:extLst>
-              <a:ext uri="{FF2B5EF4-FFF2-40B4-BE49-F238E27FC236}">
-                <a16:creationId xmlns:a16="http://schemas.microsoft.com/office/drawing/2014/main" id="{48342EC8-BD99-4F76-B742-8E1D1A3E35A0}"/>
+          <p:cNvPr id="96" name="Straight Arrow Connector 95">
+            <a:extLst>
+              <a:ext uri="{FF2B5EF4-FFF2-40B4-BE49-F238E27FC236}">
+                <a16:creationId xmlns:a16="http://schemas.microsoft.com/office/drawing/2014/main" id="{4C19282E-ACC0-4BE4-8737-091DA9FD63B8}"/>
               </a:ext>
             </a:extLst>
           </p:cNvPr>
           <p:cNvCxnSpPr>
             <a:cxnSpLocks/>
-            <a:stCxn id="6" idx="2"/>
-            <a:endCxn id="15" idx="0"/>
+            <a:stCxn id="80" idx="2"/>
+            <a:endCxn id="89" idx="0"/>
           </p:cNvCxnSpPr>
           <p:nvPr/>
         </p:nvCxnSpPr>
         <p:spPr>
           <a:xfrm flipH="1">
             <a:off x="6393660" y="3245805"/>
-            <a:ext cx="781505" cy="597683"/>
+            <a:ext cx="781508" cy="597683"/>
           </a:xfrm>
           <a:prstGeom prst="straightConnector1">
             <a:avLst/>
@@ -6900,24 +7641,24 @@
       </p:cxnSp>
       <p:cxnSp>
         <p:nvCxnSpPr>
-          <p:cNvPr id="27" name="Straight Arrow Connector 26">
-            <a:extLst>
-              <a:ext uri="{FF2B5EF4-FFF2-40B4-BE49-F238E27FC236}">
-                <a16:creationId xmlns:a16="http://schemas.microsoft.com/office/drawing/2014/main" id="{3F6F17A5-E22E-46E6-93B3-5EEA2BDB4C4B}"/>
+          <p:cNvPr id="101" name="Straight Arrow Connector 100">
+            <a:extLst>
+              <a:ext uri="{FF2B5EF4-FFF2-40B4-BE49-F238E27FC236}">
+                <a16:creationId xmlns:a16="http://schemas.microsoft.com/office/drawing/2014/main" id="{179E6489-586D-4269-B4BA-379BB5E80AF9}"/>
               </a:ext>
             </a:extLst>
           </p:cNvPr>
           <p:cNvCxnSpPr>
             <a:cxnSpLocks/>
-            <a:stCxn id="8" idx="2"/>
-            <a:endCxn id="11" idx="0"/>
+            <a:stCxn id="82" idx="2"/>
+            <a:endCxn id="85" idx="0"/>
           </p:cNvCxnSpPr>
           <p:nvPr/>
         </p:nvCxnSpPr>
         <p:spPr>
           <a:xfrm>
-            <a:off x="10097843" y="3227265"/>
-            <a:ext cx="810657" cy="622294"/>
+            <a:off x="10097846" y="3227265"/>
+            <a:ext cx="810654" cy="622294"/>
           </a:xfrm>
           <a:prstGeom prst="straightConnector1">
             <a:avLst/>
@@ -6943,24 +7684,24 @@
       </p:cxnSp>
       <p:cxnSp>
         <p:nvCxnSpPr>
-          <p:cNvPr id="28" name="Straight Arrow Connector 27">
-            <a:extLst>
-              <a:ext uri="{FF2B5EF4-FFF2-40B4-BE49-F238E27FC236}">
-                <a16:creationId xmlns:a16="http://schemas.microsoft.com/office/drawing/2014/main" id="{914C1056-9EB3-4F77-A65F-3708669C9558}"/>
+          <p:cNvPr id="102" name="Straight Arrow Connector 101">
+            <a:extLst>
+              <a:ext uri="{FF2B5EF4-FFF2-40B4-BE49-F238E27FC236}">
+                <a16:creationId xmlns:a16="http://schemas.microsoft.com/office/drawing/2014/main" id="{1EDA9D5F-2C0C-42F2-90A6-85CC534E570C}"/>
               </a:ext>
             </a:extLst>
           </p:cNvPr>
           <p:cNvCxnSpPr>
             <a:cxnSpLocks/>
-            <a:stCxn id="8" idx="2"/>
-            <a:endCxn id="10" idx="0"/>
+            <a:stCxn id="82" idx="2"/>
+            <a:endCxn id="84" idx="0"/>
           </p:cNvCxnSpPr>
           <p:nvPr/>
         </p:nvCxnSpPr>
         <p:spPr>
           <a:xfrm flipH="1">
             <a:off x="9317648" y="3227265"/>
-            <a:ext cx="780195" cy="622294"/>
+            <a:ext cx="780198" cy="622294"/>
           </a:xfrm>
           <a:prstGeom prst="straightConnector1">
             <a:avLst/>

</xml_diff>